<commit_message>
add favicon, banner in doc [skip-ci]
</commit_message>
<xml_diff>
--- a/docs/source/src/figures.pptx
+++ b/docs/source/src/figures.pptx
@@ -205,7 +205,7 @@
           <a:p>
             <a:fld id="{4EBB69F0-574D-3D4B-8E36-1ED6A00810F6}" type="datetimeFigureOut">
               <a:rPr lang="en-CN" smtClean="0"/>
-              <a:t>2020/6/4</a:t>
+              <a:t>2020/6/12</a:t>
             </a:fld>
             <a:endParaRPr lang="en-CN"/>
           </a:p>
@@ -706,7 +706,7 @@
           <a:p>
             <a:fld id="{358CDE59-EF35-0440-AE2F-CFCC4BB2BCD7}" type="datetimeFigureOut">
               <a:rPr lang="en-CN" smtClean="0"/>
-              <a:t>2020/6/4</a:t>
+              <a:t>2020/6/12</a:t>
             </a:fld>
             <a:endParaRPr lang="en-CN"/>
           </a:p>
@@ -906,7 +906,7 @@
           <a:p>
             <a:fld id="{358CDE59-EF35-0440-AE2F-CFCC4BB2BCD7}" type="datetimeFigureOut">
               <a:rPr lang="en-CN" smtClean="0"/>
-              <a:t>2020/6/4</a:t>
+              <a:t>2020/6/12</a:t>
             </a:fld>
             <a:endParaRPr lang="en-CN"/>
           </a:p>
@@ -1116,7 +1116,7 @@
           <a:p>
             <a:fld id="{358CDE59-EF35-0440-AE2F-CFCC4BB2BCD7}" type="datetimeFigureOut">
               <a:rPr lang="en-CN" smtClean="0"/>
-              <a:t>2020/6/4</a:t>
+              <a:t>2020/6/12</a:t>
             </a:fld>
             <a:endParaRPr lang="en-CN"/>
           </a:p>
@@ -1316,7 +1316,7 @@
           <a:p>
             <a:fld id="{358CDE59-EF35-0440-AE2F-CFCC4BB2BCD7}" type="datetimeFigureOut">
               <a:rPr lang="en-CN" smtClean="0"/>
-              <a:t>2020/6/4</a:t>
+              <a:t>2020/6/12</a:t>
             </a:fld>
             <a:endParaRPr lang="en-CN"/>
           </a:p>
@@ -1592,7 +1592,7 @@
           <a:p>
             <a:fld id="{358CDE59-EF35-0440-AE2F-CFCC4BB2BCD7}" type="datetimeFigureOut">
               <a:rPr lang="en-CN" smtClean="0"/>
-              <a:t>2020/6/4</a:t>
+              <a:t>2020/6/12</a:t>
             </a:fld>
             <a:endParaRPr lang="en-CN"/>
           </a:p>
@@ -1860,7 +1860,7 @@
           <a:p>
             <a:fld id="{358CDE59-EF35-0440-AE2F-CFCC4BB2BCD7}" type="datetimeFigureOut">
               <a:rPr lang="en-CN" smtClean="0"/>
-              <a:t>2020/6/4</a:t>
+              <a:t>2020/6/12</a:t>
             </a:fld>
             <a:endParaRPr lang="en-CN"/>
           </a:p>
@@ -2275,7 +2275,7 @@
           <a:p>
             <a:fld id="{358CDE59-EF35-0440-AE2F-CFCC4BB2BCD7}" type="datetimeFigureOut">
               <a:rPr lang="en-CN" smtClean="0"/>
-              <a:t>2020/6/4</a:t>
+              <a:t>2020/6/12</a:t>
             </a:fld>
             <a:endParaRPr lang="en-CN"/>
           </a:p>
@@ -2417,7 +2417,7 @@
           <a:p>
             <a:fld id="{358CDE59-EF35-0440-AE2F-CFCC4BB2BCD7}" type="datetimeFigureOut">
               <a:rPr lang="en-CN" smtClean="0"/>
-              <a:t>2020/6/4</a:t>
+              <a:t>2020/6/12</a:t>
             </a:fld>
             <a:endParaRPr lang="en-CN"/>
           </a:p>
@@ -2530,7 +2530,7 @@
           <a:p>
             <a:fld id="{358CDE59-EF35-0440-AE2F-CFCC4BB2BCD7}" type="datetimeFigureOut">
               <a:rPr lang="en-CN" smtClean="0"/>
-              <a:t>2020/6/4</a:t>
+              <a:t>2020/6/12</a:t>
             </a:fld>
             <a:endParaRPr lang="en-CN"/>
           </a:p>
@@ -2843,7 +2843,7 @@
           <a:p>
             <a:fld id="{358CDE59-EF35-0440-AE2F-CFCC4BB2BCD7}" type="datetimeFigureOut">
               <a:rPr lang="en-CN" smtClean="0"/>
-              <a:t>2020/6/4</a:t>
+              <a:t>2020/6/12</a:t>
             </a:fld>
             <a:endParaRPr lang="en-CN"/>
           </a:p>
@@ -3132,7 +3132,7 @@
           <a:p>
             <a:fld id="{358CDE59-EF35-0440-AE2F-CFCC4BB2BCD7}" type="datetimeFigureOut">
               <a:rPr lang="en-CN" smtClean="0"/>
-              <a:t>2020/6/4</a:t>
+              <a:t>2020/6/12</a:t>
             </a:fld>
             <a:endParaRPr lang="en-CN"/>
           </a:p>
@@ -3375,7 +3375,7 @@
           <a:p>
             <a:fld id="{358CDE59-EF35-0440-AE2F-CFCC4BB2BCD7}" type="datetimeFigureOut">
               <a:rPr lang="en-CN" smtClean="0"/>
-              <a:t>2020/6/4</a:t>
+              <a:t>2020/6/12</a:t>
             </a:fld>
             <a:endParaRPr lang="en-CN"/>
           </a:p>
@@ -3778,6 +3778,16 @@
 <file path=ppt/slides/slide1.xml><?xml version="1.0" encoding="utf-8"?>
 <p:sld xmlns:a="http://schemas.openxmlformats.org/drawingml/2006/main" xmlns:r="http://schemas.openxmlformats.org/officeDocument/2006/relationships" xmlns:p="http://schemas.openxmlformats.org/presentationml/2006/main">
   <p:cSld>
+    <p:bg>
+      <p:bgPr>
+        <a:solidFill>
+          <a:schemeClr val="bg1">
+            <a:lumMod val="65000"/>
+          </a:schemeClr>
+        </a:solidFill>
+        <a:effectLst/>
+      </p:bgPr>
+    </p:bg>
     <p:spTree>
       <p:nvGrpSpPr>
         <p:cNvPr id="1" name=""/>
@@ -4874,9 +4884,9 @@
         <p:grpSpPr>
           <a:xfrm>
             <a:off x="3089748" y="3603844"/>
-            <a:ext cx="4474195" cy="1642134"/>
+            <a:ext cx="4665850" cy="1642134"/>
             <a:chOff x="3089748" y="3603844"/>
-            <a:chExt cx="4474195" cy="1642134"/>
+            <a:chExt cx="4665850" cy="1642134"/>
           </a:xfrm>
         </p:grpSpPr>
         <p:grpSp>
@@ -5961,7 +5971,7 @@
           <p:spPr>
             <a:xfrm>
               <a:off x="5018951" y="3875495"/>
-              <a:ext cx="2544992" cy="830997"/>
+              <a:ext cx="2736647" cy="830997"/>
             </a:xfrm>
             <a:prstGeom prst="rect">
               <a:avLst/>
@@ -5975,10 +5985,13 @@
             <a:lstStyle/>
             <a:p>
               <a:r>
-                <a:rPr lang="en-CN" sz="4800" dirty="0">
+                <a:rPr lang="en-CN" sz="4800" b="1" dirty="0">
                   <a:solidFill>
                     <a:schemeClr val="bg1"/>
                   </a:solidFill>
+                  <a:latin typeface="LingWai SC Medium" panose="03050602040302020204" pitchFamily="66" charset="-122"/>
+                  <a:ea typeface="LingWai SC Medium" panose="03050602040302020204" pitchFamily="66" charset="-122"/>
+                  <a:cs typeface="LingWai SC Medium" panose="03050602040302020204" pitchFamily="66" charset="-122"/>
                 </a:rPr>
                 <a:t>SpatialTis</a:t>
               </a:r>

</xml_diff>